<commit_message>
add some calculates and do coach
</commit_message>
<xml_diff>
--- a/activity_tracking_1014.pptx
+++ b/activity_tracking_1014.pptx
@@ -109,6 +109,11 @@
       </a:defRPr>
     </a:lvl9pPr>
   </p:defaultTextStyle>
+  <p:extLst>
+    <p:ext uri="{EFAFB233-063F-42B5-8137-9DF3F51BA10A}">
+      <p15:sldGuideLst xmlns:p15="http://schemas.microsoft.com/office/powerpoint/2012/main"/>
+    </p:ext>
+  </p:extLst>
 </p:presentation>
 </file>
 
@@ -261,7 +266,7 @@
           <a:p>
             <a:fld id="{406A671B-DCC4-4CF7-A1F0-5D2F2E0A843A}" type="datetimeFigureOut">
               <a:rPr lang="zh-CN" altLang="en-US" smtClean="0"/>
-              <a:t>2021/10/20</a:t>
+              <a:t>2021/11/9</a:t>
             </a:fld>
             <a:endParaRPr lang="zh-CN" altLang="en-US"/>
           </a:p>
@@ -461,7 +466,7 @@
           <a:p>
             <a:fld id="{406A671B-DCC4-4CF7-A1F0-5D2F2E0A843A}" type="datetimeFigureOut">
               <a:rPr lang="zh-CN" altLang="en-US" smtClean="0"/>
-              <a:t>2021/10/20</a:t>
+              <a:t>2021/11/9</a:t>
             </a:fld>
             <a:endParaRPr lang="zh-CN" altLang="en-US"/>
           </a:p>
@@ -671,7 +676,7 @@
           <a:p>
             <a:fld id="{406A671B-DCC4-4CF7-A1F0-5D2F2E0A843A}" type="datetimeFigureOut">
               <a:rPr lang="zh-CN" altLang="en-US" smtClean="0"/>
-              <a:t>2021/10/20</a:t>
+              <a:t>2021/11/9</a:t>
             </a:fld>
             <a:endParaRPr lang="zh-CN" altLang="en-US"/>
           </a:p>
@@ -871,7 +876,7 @@
           <a:p>
             <a:fld id="{406A671B-DCC4-4CF7-A1F0-5D2F2E0A843A}" type="datetimeFigureOut">
               <a:rPr lang="zh-CN" altLang="en-US" smtClean="0"/>
-              <a:t>2021/10/20</a:t>
+              <a:t>2021/11/9</a:t>
             </a:fld>
             <a:endParaRPr lang="zh-CN" altLang="en-US"/>
           </a:p>
@@ -1147,7 +1152,7 @@
           <a:p>
             <a:fld id="{406A671B-DCC4-4CF7-A1F0-5D2F2E0A843A}" type="datetimeFigureOut">
               <a:rPr lang="zh-CN" altLang="en-US" smtClean="0"/>
-              <a:t>2021/10/20</a:t>
+              <a:t>2021/11/9</a:t>
             </a:fld>
             <a:endParaRPr lang="zh-CN" altLang="en-US"/>
           </a:p>
@@ -1415,7 +1420,7 @@
           <a:p>
             <a:fld id="{406A671B-DCC4-4CF7-A1F0-5D2F2E0A843A}" type="datetimeFigureOut">
               <a:rPr lang="zh-CN" altLang="en-US" smtClean="0"/>
-              <a:t>2021/10/20</a:t>
+              <a:t>2021/11/9</a:t>
             </a:fld>
             <a:endParaRPr lang="zh-CN" altLang="en-US"/>
           </a:p>
@@ -1830,7 +1835,7 @@
           <a:p>
             <a:fld id="{406A671B-DCC4-4CF7-A1F0-5D2F2E0A843A}" type="datetimeFigureOut">
               <a:rPr lang="zh-CN" altLang="en-US" smtClean="0"/>
-              <a:t>2021/10/20</a:t>
+              <a:t>2021/11/9</a:t>
             </a:fld>
             <a:endParaRPr lang="zh-CN" altLang="en-US"/>
           </a:p>
@@ -1972,7 +1977,7 @@
           <a:p>
             <a:fld id="{406A671B-DCC4-4CF7-A1F0-5D2F2E0A843A}" type="datetimeFigureOut">
               <a:rPr lang="zh-CN" altLang="en-US" smtClean="0"/>
-              <a:t>2021/10/20</a:t>
+              <a:t>2021/11/9</a:t>
             </a:fld>
             <a:endParaRPr lang="zh-CN" altLang="en-US"/>
           </a:p>
@@ -2085,7 +2090,7 @@
           <a:p>
             <a:fld id="{406A671B-DCC4-4CF7-A1F0-5D2F2E0A843A}" type="datetimeFigureOut">
               <a:rPr lang="zh-CN" altLang="en-US" smtClean="0"/>
-              <a:t>2021/10/20</a:t>
+              <a:t>2021/11/9</a:t>
             </a:fld>
             <a:endParaRPr lang="zh-CN" altLang="en-US"/>
           </a:p>
@@ -2398,7 +2403,7 @@
           <a:p>
             <a:fld id="{406A671B-DCC4-4CF7-A1F0-5D2F2E0A843A}" type="datetimeFigureOut">
               <a:rPr lang="zh-CN" altLang="en-US" smtClean="0"/>
-              <a:t>2021/10/20</a:t>
+              <a:t>2021/11/9</a:t>
             </a:fld>
             <a:endParaRPr lang="zh-CN" altLang="en-US"/>
           </a:p>
@@ -2687,7 +2692,7 @@
           <a:p>
             <a:fld id="{406A671B-DCC4-4CF7-A1F0-5D2F2E0A843A}" type="datetimeFigureOut">
               <a:rPr lang="zh-CN" altLang="en-US" smtClean="0"/>
-              <a:t>2021/10/20</a:t>
+              <a:t>2021/11/9</a:t>
             </a:fld>
             <a:endParaRPr lang="zh-CN" altLang="en-US"/>
           </a:p>
@@ -2930,7 +2935,7 @@
           <a:p>
             <a:fld id="{406A671B-DCC4-4CF7-A1F0-5D2F2E0A843A}" type="datetimeFigureOut">
               <a:rPr lang="zh-CN" altLang="en-US" smtClean="0"/>
-              <a:t>2021/10/20</a:t>
+              <a:t>2021/11/9</a:t>
             </a:fld>
             <a:endParaRPr lang="zh-CN" altLang="en-US"/>
           </a:p>
@@ -3369,7 +3374,7 @@
         </p:blipFill>
         <p:spPr>
           <a:xfrm>
-            <a:off x="-1" y="0"/>
+            <a:off x="-131754" y="34498"/>
             <a:ext cx="12211665" cy="6858000"/>
           </a:xfrm>
           <a:prstGeom prst="rect">
@@ -3443,7 +3448,7 @@
         </p:nvSpPr>
         <p:spPr>
           <a:xfrm>
-            <a:off x="6105831" y="3094166"/>
+            <a:off x="6217920" y="2132632"/>
             <a:ext cx="5974080" cy="369332"/>
           </a:xfrm>
           <a:prstGeom prst="rect">
@@ -3511,7 +3516,85 @@
         </p:nvSpPr>
         <p:spPr>
           <a:xfrm>
-            <a:off x="-1" y="2782669"/>
+            <a:off x="0" y="2644170"/>
+            <a:ext cx="4815840" cy="923330"/>
+          </a:xfrm>
+          <a:prstGeom prst="rect">
+            <a:avLst/>
+          </a:prstGeom>
+          <a:noFill/>
+        </p:spPr>
+        <p:txBody>
+          <a:bodyPr wrap="square" rtlCol="0">
+            <a:spAutoFit/>
+          </a:bodyPr>
+          <a:lstStyle/>
+          <a:p>
+            <a:r>
+              <a:rPr lang="zh-CN" altLang="en-US" dirty="0">
+                <a:solidFill>
+                  <a:srgbClr val="FF0000"/>
+                </a:solidFill>
+              </a:rPr>
+              <a:t>操作工作耗时占比</a:t>
+            </a:r>
+            <a:endParaRPr lang="en-US" altLang="zh-CN" dirty="0">
+              <a:solidFill>
+                <a:srgbClr val="FF0000"/>
+              </a:solidFill>
+            </a:endParaRPr>
+          </a:p>
+          <a:p>
+            <a:r>
+              <a:rPr lang="en-US" altLang="zh-CN" dirty="0">
+                <a:solidFill>
+                  <a:srgbClr val="FF0000"/>
+                </a:solidFill>
+              </a:rPr>
+              <a:t> activity end time -  </a:t>
+            </a:r>
+            <a:r>
+              <a:rPr lang="en-US" altLang="zh-CN" dirty="0" err="1">
+                <a:solidFill>
+                  <a:srgbClr val="FF0000"/>
+                </a:solidFill>
+              </a:rPr>
+              <a:t>actitvity</a:t>
+            </a:r>
+            <a:r>
+              <a:rPr lang="en-US" altLang="zh-CN" dirty="0">
+                <a:solidFill>
+                  <a:srgbClr val="FF0000"/>
+                </a:solidFill>
+              </a:rPr>
+              <a:t> start time , </a:t>
+            </a:r>
+            <a:r>
+              <a:rPr lang="zh-CN" altLang="en-US" dirty="0">
+                <a:solidFill>
+                  <a:srgbClr val="FF0000"/>
+                </a:solidFill>
+              </a:rPr>
+              <a:t>面积越大则该活动涉及耗时越多</a:t>
+            </a:r>
+          </a:p>
+        </p:txBody>
+      </p:sp>
+      <p:sp>
+        <p:nvSpPr>
+          <p:cNvPr id="9" name="TextBox 8">
+            <a:extLst>
+              <a:ext uri="{FF2B5EF4-FFF2-40B4-BE49-F238E27FC236}">
+                <a16:creationId xmlns:a16="http://schemas.microsoft.com/office/drawing/2014/main" id="{D4150B7D-786E-46DD-8E77-D89522138A78}"/>
+              </a:ext>
+            </a:extLst>
+          </p:cNvPr>
+          <p:cNvSpPr txBox="1"/>
+          <p:nvPr/>
+        </p:nvSpPr>
+        <p:spPr>
+          <a:xfrm>
+            <a:off x="-131754" y="6177171"/>
             <a:ext cx="4815840" cy="646331"/>
           </a:xfrm>
           <a:prstGeom prst="rect">
@@ -3531,22 +3614,15 @@
                   <a:srgbClr val="FF0000"/>
                 </a:solidFill>
               </a:rPr>
-              <a:t>操作工作耗时占比</a:t>
-            </a:r>
-            <a:endParaRPr lang="en-US" altLang="zh-CN" dirty="0">
-              <a:solidFill>
-                <a:srgbClr val="FF0000"/>
-              </a:solidFill>
-            </a:endParaRPr>
-          </a:p>
-          <a:p>
+              <a:t>操作类型对应</a:t>
+            </a:r>
             <a:r>
               <a:rPr lang="en-US" altLang="zh-CN" dirty="0">
                 <a:solidFill>
                   <a:srgbClr val="FF0000"/>
                 </a:solidFill>
               </a:rPr>
-              <a:t> activity end time -  </a:t>
+              <a:t>distinct </a:t>
             </a:r>
             <a:r>
               <a:rPr lang="en-US" altLang="zh-CN" dirty="0" err="1">
@@ -3554,7 +3630,7 @@
                   <a:srgbClr val="FF0000"/>
                 </a:solidFill>
               </a:rPr>
-              <a:t>actitvity</a:t>
+              <a:t>lpn</a:t>
             </a:r>
             <a:r>
               <a:rPr lang="en-US" altLang="zh-CN" dirty="0">
@@ -3562,22 +3638,57 @@
                   <a:srgbClr val="FF0000"/>
                 </a:solidFill>
               </a:rPr>
-              <a:t> start time</a:t>
-            </a:r>
-            <a:endParaRPr lang="zh-CN" altLang="en-US" dirty="0">
-              <a:solidFill>
-                <a:srgbClr val="FF0000"/>
-              </a:solidFill>
-            </a:endParaRPr>
-          </a:p>
-        </p:txBody>
-      </p:sp>
-      <p:sp>
-        <p:nvSpPr>
-          <p:cNvPr id="9" name="TextBox 8">
-            <a:extLst>
-              <a:ext uri="{FF2B5EF4-FFF2-40B4-BE49-F238E27FC236}">
-                <a16:creationId xmlns:a16="http://schemas.microsoft.com/office/drawing/2014/main" id="{D4150B7D-786E-46DD-8E77-D89522138A78}"/>
+              <a:t> </a:t>
+            </a:r>
+            <a:r>
+              <a:rPr lang="zh-CN" altLang="en-US" dirty="0">
+                <a:solidFill>
+                  <a:srgbClr val="FF0000"/>
+                </a:solidFill>
+              </a:rPr>
+              <a:t>数量占比</a:t>
+            </a:r>
+            <a:r>
+              <a:rPr lang="en-US" altLang="zh-CN" dirty="0">
+                <a:solidFill>
+                  <a:srgbClr val="FF0000"/>
+                </a:solidFill>
+              </a:rPr>
+              <a:t>,  </a:t>
+            </a:r>
+            <a:r>
+              <a:rPr lang="zh-CN" altLang="en-US" dirty="0">
+                <a:solidFill>
+                  <a:srgbClr val="FF0000"/>
+                </a:solidFill>
+              </a:rPr>
+              <a:t>面积越大则该活动涉及</a:t>
+            </a:r>
+            <a:r>
+              <a:rPr lang="en-US" altLang="zh-CN" dirty="0" err="1">
+                <a:solidFill>
+                  <a:srgbClr val="FF0000"/>
+                </a:solidFill>
+              </a:rPr>
+              <a:t>lpn</a:t>
+            </a:r>
+            <a:r>
+              <a:rPr lang="zh-CN" altLang="en-US" dirty="0">
+                <a:solidFill>
+                  <a:srgbClr val="FF0000"/>
+                </a:solidFill>
+              </a:rPr>
+              <a:t>越多</a:t>
+            </a:r>
+          </a:p>
+        </p:txBody>
+      </p:sp>
+      <p:sp>
+        <p:nvSpPr>
+          <p:cNvPr id="10" name="TextBox 9">
+            <a:extLst>
+              <a:ext uri="{FF2B5EF4-FFF2-40B4-BE49-F238E27FC236}">
+                <a16:creationId xmlns:a16="http://schemas.microsoft.com/office/drawing/2014/main" id="{0B6128D8-C485-4A31-B160-CC06372BF376}"/>
               </a:ext>
             </a:extLst>
           </p:cNvPr>
@@ -3586,8 +3697,8 @@
         </p:nvSpPr>
         <p:spPr>
           <a:xfrm>
-            <a:off x="-1" y="6467177"/>
-            <a:ext cx="4815840" cy="369332"/>
+            <a:off x="6105831" y="5968194"/>
+            <a:ext cx="4815840" cy="646331"/>
           </a:xfrm>
           <a:prstGeom prst="rect">
             <a:avLst/>
@@ -3614,15 +3725,15 @@
                   <a:srgbClr val="FF0000"/>
                 </a:solidFill>
               </a:rPr>
-              <a:t>distinct </a:t>
-            </a:r>
-            <a:r>
-              <a:rPr lang="en-US" altLang="zh-CN" dirty="0" err="1">
-                <a:solidFill>
-                  <a:srgbClr val="FF0000"/>
-                </a:solidFill>
-              </a:rPr>
-              <a:t>lpn</a:t>
+              <a:t>qty</a:t>
+            </a:r>
+            <a:r>
+              <a:rPr lang="zh-CN" altLang="en-US" dirty="0">
+                <a:solidFill>
+                  <a:srgbClr val="FF0000"/>
+                </a:solidFill>
+              </a:rPr>
+              <a:t>占比</a:t>
             </a:r>
             <a:r>
               <a:rPr lang="en-US" altLang="zh-CN" dirty="0">
@@ -3630,7 +3741,7 @@
                   <a:srgbClr val="FF0000"/>
                 </a:solidFill>
               </a:rPr>
-              <a:t> </a:t>
+              <a:t>, </a:t>
             </a:r>
             <a:r>
               <a:rPr lang="zh-CN" altLang="en-US" dirty="0">
@@ -3638,62 +3749,23 @@
                   <a:srgbClr val="FF0000"/>
                 </a:solidFill>
               </a:rPr>
-              <a:t>数量占比</a:t>
-            </a:r>
-          </a:p>
-        </p:txBody>
-      </p:sp>
-      <p:sp>
-        <p:nvSpPr>
-          <p:cNvPr id="10" name="TextBox 9">
-            <a:extLst>
-              <a:ext uri="{FF2B5EF4-FFF2-40B4-BE49-F238E27FC236}">
-                <a16:creationId xmlns:a16="http://schemas.microsoft.com/office/drawing/2014/main" id="{0B6128D8-C485-4A31-B160-CC06372BF376}"/>
-              </a:ext>
-            </a:extLst>
-          </p:cNvPr>
-          <p:cNvSpPr txBox="1"/>
-          <p:nvPr/>
-        </p:nvSpPr>
-        <p:spPr>
-          <a:xfrm>
-            <a:off x="6096000" y="6467177"/>
-            <a:ext cx="4815840" cy="369332"/>
-          </a:xfrm>
-          <a:prstGeom prst="rect">
-            <a:avLst/>
-          </a:prstGeom>
-          <a:noFill/>
-        </p:spPr>
-        <p:txBody>
-          <a:bodyPr wrap="square" rtlCol="0">
-            <a:spAutoFit/>
-          </a:bodyPr>
-          <a:lstStyle/>
-          <a:p>
+              <a:t>面积越大则该活动涉及</a:t>
+            </a:r>
+            <a:r>
+              <a:rPr lang="en-US" altLang="zh-CN" dirty="0">
+                <a:solidFill>
+                  <a:srgbClr val="FF0000"/>
+                </a:solidFill>
+              </a:rPr>
+              <a:t>qty</a:t>
+            </a:r>
             <a:r>
               <a:rPr lang="zh-CN" altLang="en-US" dirty="0">
                 <a:solidFill>
                   <a:srgbClr val="FF0000"/>
                 </a:solidFill>
               </a:rPr>
-              <a:t>操作类型对应</a:t>
-            </a:r>
-            <a:r>
-              <a:rPr lang="en-US" altLang="zh-CN" dirty="0">
-                <a:solidFill>
-                  <a:srgbClr val="FF0000"/>
-                </a:solidFill>
-              </a:rPr>
-              <a:t>qty</a:t>
-            </a:r>
-            <a:r>
-              <a:rPr lang="zh-CN" altLang="en-US" dirty="0">
-                <a:solidFill>
-                  <a:srgbClr val="FF0000"/>
-                </a:solidFill>
-              </a:rPr>
-              <a:t>占比</a:t>
+              <a:t>越多</a:t>
             </a:r>
           </a:p>
         </p:txBody>
@@ -3772,8 +3844,8 @@
         </p:nvSpPr>
         <p:spPr>
           <a:xfrm>
-            <a:off x="4038600" y="1844040"/>
-            <a:ext cx="5044440" cy="369332"/>
+            <a:off x="4029173" y="1715017"/>
+            <a:ext cx="5044440" cy="646331"/>
           </a:xfrm>
           <a:prstGeom prst="rect">
             <a:avLst/>
@@ -3792,7 +3864,7 @@
                   <a:srgbClr val="FF0000"/>
                 </a:solidFill>
               </a:rPr>
-              <a:t>操作工</a:t>
+              <a:t>操作工操作过程追踪</a:t>
             </a:r>
             <a:r>
               <a:rPr lang="en-US" altLang="zh-CN" dirty="0">
@@ -3800,7 +3872,7 @@
                   <a:srgbClr val="FF0000"/>
                 </a:solidFill>
               </a:rPr>
-              <a:t>activity tracking </a:t>
+              <a:t>, activity tracking </a:t>
             </a:r>
             <a:r>
               <a:rPr lang="zh-CN" altLang="en-US" dirty="0">
@@ -3827,8 +3899,8 @@
         </p:nvSpPr>
         <p:spPr>
           <a:xfrm>
-            <a:off x="7147560" y="4492229"/>
-            <a:ext cx="5044440" cy="923330"/>
+            <a:off x="7222975" y="3804072"/>
+            <a:ext cx="5044440" cy="1200329"/>
           </a:xfrm>
           <a:prstGeom prst="rect">
             <a:avLst/>
@@ -3842,6 +3914,24 @@
           <a:lstStyle/>
           <a:p>
             <a:r>
+              <a:rPr lang="zh-CN" altLang="en-US" dirty="0">
+                <a:solidFill>
+                  <a:srgbClr val="FF0000"/>
+                </a:solidFill>
+              </a:rPr>
+              <a:t>操作工空闲时间</a:t>
+            </a:r>
+            <a:r>
+              <a:rPr lang="en-US" altLang="zh-CN" dirty="0">
+                <a:solidFill>
+                  <a:srgbClr val="FF0000"/>
+                </a:solidFill>
+              </a:rPr>
+              <a:t>;</a:t>
+            </a:r>
+          </a:p>
+          <a:p>
+            <a:r>
               <a:rPr lang="en-US" altLang="zh-CN" dirty="0">
                 <a:solidFill>
                   <a:srgbClr val="FF0000"/>
@@ -3880,12 +3970,20 @@
               </a:rPr>
             </a:br>
             <a:r>
+              <a:rPr lang="zh-CN" altLang="en-US" dirty="0">
+                <a:solidFill>
+                  <a:srgbClr val="FF0000"/>
+                </a:solidFill>
+              </a:rPr>
+              <a:t>上一个</a:t>
+            </a:r>
+            <a:r>
               <a:rPr lang="en-US" altLang="zh-CN" dirty="0">
                 <a:solidFill>
                   <a:srgbClr val="FF0000"/>
                 </a:solidFill>
               </a:rPr>
-              <a:t>activity </a:t>
+              <a:t>activity</a:t>
             </a:r>
             <a:r>
               <a:rPr lang="zh-CN" altLang="en-US" dirty="0">
@@ -4037,7 +4135,7 @@
                   <a:srgbClr val="FF0000"/>
                 </a:solidFill>
               </a:rPr>
-              <a:t>工时总览</a:t>
+              <a:t>当日总工时一览</a:t>
             </a:r>
           </a:p>
         </p:txBody>
@@ -4116,8 +4214,8 @@
         </p:nvSpPr>
         <p:spPr>
           <a:xfrm>
-            <a:off x="1737360" y="2118360"/>
-            <a:ext cx="3810000" cy="369332"/>
+            <a:off x="624997" y="1467910"/>
+            <a:ext cx="3810000" cy="1200329"/>
           </a:xfrm>
           <a:prstGeom prst="rect">
             <a:avLst/>
@@ -4138,6 +4236,103 @@
               </a:rPr>
               <a:t>各操作项耗时的集中分布</a:t>
             </a:r>
+            <a:r>
+              <a:rPr lang="en-US" altLang="zh-CN" dirty="0">
+                <a:solidFill>
+                  <a:srgbClr val="FFFF00"/>
+                </a:solidFill>
+              </a:rPr>
+              <a:t>,</a:t>
+            </a:r>
+          </a:p>
+          <a:p>
+            <a:r>
+              <a:rPr lang="en-US" altLang="zh-CN" dirty="0">
+                <a:solidFill>
+                  <a:srgbClr val="FFFF00"/>
+                </a:solidFill>
+              </a:rPr>
+              <a:t>“</a:t>
+            </a:r>
+            <a:r>
+              <a:rPr lang="zh-CN" altLang="en-US" dirty="0">
+                <a:solidFill>
+                  <a:srgbClr val="FFFF00"/>
+                </a:solidFill>
+              </a:rPr>
+              <a:t>十秒以内的所有操作活动中</a:t>
+            </a:r>
+            <a:r>
+              <a:rPr lang="en-US" altLang="zh-CN" dirty="0">
+                <a:solidFill>
+                  <a:srgbClr val="FFFF00"/>
+                </a:solidFill>
+              </a:rPr>
+              <a:t>, packing</a:t>
+            </a:r>
+            <a:r>
+              <a:rPr lang="zh-CN" altLang="en-US" dirty="0">
+                <a:solidFill>
+                  <a:srgbClr val="FFFF00"/>
+                </a:solidFill>
+              </a:rPr>
+              <a:t>占比最大</a:t>
+            </a:r>
+            <a:r>
+              <a:rPr lang="en-US" altLang="zh-CN" dirty="0">
+                <a:solidFill>
+                  <a:srgbClr val="FFFF00"/>
+                </a:solidFill>
+              </a:rPr>
+              <a:t>, shipping</a:t>
+            </a:r>
+            <a:r>
+              <a:rPr lang="zh-CN" altLang="en-US" dirty="0">
+                <a:solidFill>
+                  <a:srgbClr val="FFFF00"/>
+                </a:solidFill>
+              </a:rPr>
+              <a:t>占比第二</a:t>
+            </a:r>
+            <a:r>
+              <a:rPr lang="en-US" altLang="zh-CN" dirty="0">
+                <a:solidFill>
+                  <a:srgbClr val="FFFF00"/>
+                </a:solidFill>
+              </a:rPr>
+              <a:t>, </a:t>
+            </a:r>
+          </a:p>
+          <a:p>
+            <a:r>
+              <a:rPr lang="en-US" altLang="zh-CN" dirty="0">
+                <a:solidFill>
+                  <a:srgbClr val="FFFF00"/>
+                </a:solidFill>
+              </a:rPr>
+              <a:t>(</a:t>
+            </a:r>
+            <a:r>
+              <a:rPr lang="zh-CN" altLang="en-US" dirty="0">
+                <a:solidFill>
+                  <a:srgbClr val="FFFF00"/>
+                </a:solidFill>
+              </a:rPr>
+              <a:t>可以选择单个操作工看</a:t>
+            </a:r>
+            <a:r>
+              <a:rPr lang="en-US" altLang="zh-CN" dirty="0">
+                <a:solidFill>
+                  <a:srgbClr val="FFFF00"/>
+                </a:solidFill>
+              </a:rPr>
+              <a:t>)”</a:t>
+            </a:r>
+            <a:endParaRPr lang="zh-CN" altLang="en-US" dirty="0">
+              <a:solidFill>
+                <a:srgbClr val="FFFF00"/>
+              </a:solidFill>
+            </a:endParaRPr>
           </a:p>
         </p:txBody>
       </p:sp>
@@ -4319,8 +4514,8 @@
         </p:nvSpPr>
         <p:spPr>
           <a:xfrm>
-            <a:off x="1306286" y="631372"/>
-            <a:ext cx="5812971" cy="646331"/>
+            <a:off x="1287432" y="367421"/>
+            <a:ext cx="5812971" cy="1200329"/>
           </a:xfrm>
           <a:prstGeom prst="rect">
             <a:avLst/>
@@ -4372,6 +4567,47 @@
                 </a:solidFill>
               </a:rPr>
               <a:t>)</a:t>
+            </a:r>
+          </a:p>
+          <a:p>
+            <a:endParaRPr lang="en-US" altLang="zh-CN" dirty="0">
+              <a:solidFill>
+                <a:srgbClr val="FF0000"/>
+              </a:solidFill>
+            </a:endParaRPr>
+          </a:p>
+          <a:p>
+            <a:r>
+              <a:rPr lang="zh-CN" altLang="en-US" dirty="0">
+                <a:solidFill>
+                  <a:srgbClr val="FF0000"/>
+                </a:solidFill>
+              </a:rPr>
+              <a:t>显示各项工作带来的时间消费</a:t>
+            </a:r>
+            <a:r>
+              <a:rPr lang="en-US" altLang="zh-CN" dirty="0">
+                <a:solidFill>
+                  <a:srgbClr val="FF0000"/>
+                </a:solidFill>
+              </a:rPr>
+              <a:t>, </a:t>
+            </a:r>
+            <a:r>
+              <a:rPr lang="zh-CN" altLang="en-US" dirty="0">
+                <a:solidFill>
+                  <a:srgbClr val="FF0000"/>
+                </a:solidFill>
+              </a:rPr>
+              <a:t>横向比较获得效率排名</a:t>
+            </a:r>
+            <a:r>
+              <a:rPr lang="en-US" altLang="zh-CN" dirty="0">
+                <a:solidFill>
+                  <a:srgbClr val="FF0000"/>
+                </a:solidFill>
+              </a:rPr>
+              <a:t>.</a:t>
             </a:r>
             <a:endParaRPr lang="zh-CN" altLang="en-US" dirty="0">
               <a:solidFill>

</xml_diff>